<commit_message>
Final version of the script for MES13 TIIA manuscript submission (Wenji, Jan 2019)
</commit_message>
<xml_diff>
--- a/docs/mes13_tiia_v3.pptx
+++ b/docs/mes13_tiia_v3.pptx
@@ -128,23 +128,187 @@
 <pc:chgInfo xmlns:a="http://schemas.openxmlformats.org/drawingml/2006/main" xmlns:r="http://schemas.openxmlformats.org/officeDocument/2006/relationships" xmlns:ac="http://schemas.microsoft.com/office/drawing/2013/main/command" xmlns:pc="http://schemas.microsoft.com/office/powerpoint/2013/main/command">
   <pc:docChgLst>
     <pc:chgData name="Sargsyan, Davit [JRDUS]" userId="3e31b559-84b2-4844-9a39-5ca6ce0fe171" providerId="ADAL" clId="{3F98F558-2F5A-4144-952E-4DC6CA9B686E}"/>
-    <pc:docChg chg="modSld">
-      <pc:chgData name="Sargsyan, Davit [JRDUS]" userId="3e31b559-84b2-4844-9a39-5ca6ce0fe171" providerId="ADAL" clId="{3F98F558-2F5A-4144-952E-4DC6CA9B686E}" dt="2018-11-03T00:04:57.572" v="2" actId="1076"/>
+    <pc:docChg chg="undo custSel modSld">
+      <pc:chgData name="Sargsyan, Davit [JRDUS]" userId="3e31b559-84b2-4844-9a39-5ca6ce0fe171" providerId="ADAL" clId="{3F98F558-2F5A-4144-952E-4DC6CA9B686E}" dt="2018-11-05T03:39:26" v="572" actId="20577"/>
       <pc:docMkLst>
         <pc:docMk/>
       </pc:docMkLst>
-      <pc:sldChg chg="modSp">
-        <pc:chgData name="Sargsyan, Davit [JRDUS]" userId="3e31b559-84b2-4844-9a39-5ca6ce0fe171" providerId="ADAL" clId="{3F98F558-2F5A-4144-952E-4DC6CA9B686E}" dt="2018-11-03T00:04:57.572" v="2" actId="1076"/>
+      <pc:sldChg chg="addSp modSp">
+        <pc:chgData name="Sargsyan, Davit [JRDUS]" userId="3e31b559-84b2-4844-9a39-5ca6ce0fe171" providerId="ADAL" clId="{3F98F558-2F5A-4144-952E-4DC6CA9B686E}" dt="2018-11-05T03:25:55.359" v="280" actId="20577"/>
         <pc:sldMkLst>
           <pc:docMk/>
           <pc:sldMk cId="1510804552" sldId="278"/>
         </pc:sldMkLst>
+        <pc:spChg chg="add mod">
+          <ac:chgData name="Sargsyan, Davit [JRDUS]" userId="3e31b559-84b2-4844-9a39-5ca6ce0fe171" providerId="ADAL" clId="{3F98F558-2F5A-4144-952E-4DC6CA9B686E}" dt="2018-11-05T03:25:55.359" v="280" actId="20577"/>
+          <ac:spMkLst>
+            <pc:docMk/>
+            <pc:sldMk cId="1510804552" sldId="278"/>
+            <ac:spMk id="3" creationId="{C1421D1E-A114-4647-8F5E-8BF308E6776E}"/>
+          </ac:spMkLst>
+        </pc:spChg>
         <pc:picChg chg="mod modCrop">
           <ac:chgData name="Sargsyan, Davit [JRDUS]" userId="3e31b559-84b2-4844-9a39-5ca6ce0fe171" providerId="ADAL" clId="{3F98F558-2F5A-4144-952E-4DC6CA9B686E}" dt="2018-11-03T00:04:57.572" v="2" actId="1076"/>
           <ac:picMkLst>
             <pc:docMk/>
             <pc:sldMk cId="1510804552" sldId="278"/>
             <ac:picMk id="4" creationId="{BBEC111F-18AA-4940-A1BC-9EE39F9FA37F}"/>
+          </ac:picMkLst>
+        </pc:picChg>
+        <pc:picChg chg="mod">
+          <ac:chgData name="Sargsyan, Davit [JRDUS]" userId="3e31b559-84b2-4844-9a39-5ca6ce0fe171" providerId="ADAL" clId="{3F98F558-2F5A-4144-952E-4DC6CA9B686E}" dt="2018-11-05T03:18:05.506" v="4" actId="1076"/>
+          <ac:picMkLst>
+            <pc:docMk/>
+            <pc:sldMk cId="1510804552" sldId="278"/>
+            <ac:picMk id="6" creationId="{8852D547-1F7B-4D62-ADE3-A9FEA744DDEC}"/>
+          </ac:picMkLst>
+        </pc:picChg>
+      </pc:sldChg>
+      <pc:sldChg chg="addSp modSp">
+        <pc:chgData name="Sargsyan, Davit [JRDUS]" userId="3e31b559-84b2-4844-9a39-5ca6ce0fe171" providerId="ADAL" clId="{3F98F558-2F5A-4144-952E-4DC6CA9B686E}" dt="2018-11-05T03:19:37.806" v="58" actId="20577"/>
+        <pc:sldMkLst>
+          <pc:docMk/>
+          <pc:sldMk cId="2216538724" sldId="279"/>
+        </pc:sldMkLst>
+        <pc:spChg chg="add mod">
+          <ac:chgData name="Sargsyan, Davit [JRDUS]" userId="3e31b559-84b2-4844-9a39-5ca6ce0fe171" providerId="ADAL" clId="{3F98F558-2F5A-4144-952E-4DC6CA9B686E}" dt="2018-11-05T03:19:37.806" v="58" actId="20577"/>
+          <ac:spMkLst>
+            <pc:docMk/>
+            <pc:sldMk cId="2216538724" sldId="279"/>
+            <ac:spMk id="3" creationId="{8834F32D-79E0-46A4-B244-B497B8F3EE3D}"/>
+          </ac:spMkLst>
+        </pc:spChg>
+        <pc:picChg chg="mod">
+          <ac:chgData name="Sargsyan, Davit [JRDUS]" userId="3e31b559-84b2-4844-9a39-5ca6ce0fe171" providerId="ADAL" clId="{3F98F558-2F5A-4144-952E-4DC6CA9B686E}" dt="2018-11-05T03:18:41.261" v="5" actId="1076"/>
+          <ac:picMkLst>
+            <pc:docMk/>
+            <pc:sldMk cId="2216538724" sldId="279"/>
+            <ac:picMk id="5" creationId="{9EF50985-65F4-4626-844F-1A4804B3180D}"/>
+          </ac:picMkLst>
+        </pc:picChg>
+      </pc:sldChg>
+      <pc:sldChg chg="addSp modSp">
+        <pc:chgData name="Sargsyan, Davit [JRDUS]" userId="3e31b559-84b2-4844-9a39-5ca6ce0fe171" providerId="ADAL" clId="{3F98F558-2F5A-4144-952E-4DC6CA9B686E}" dt="2018-11-05T03:25:07.793" v="222" actId="20577"/>
+        <pc:sldMkLst>
+          <pc:docMk/>
+          <pc:sldMk cId="159332473" sldId="282"/>
+        </pc:sldMkLst>
+        <pc:spChg chg="add mod">
+          <ac:chgData name="Sargsyan, Davit [JRDUS]" userId="3e31b559-84b2-4844-9a39-5ca6ce0fe171" providerId="ADAL" clId="{3F98F558-2F5A-4144-952E-4DC6CA9B686E}" dt="2018-11-05T03:25:07.793" v="222" actId="20577"/>
+          <ac:spMkLst>
+            <pc:docMk/>
+            <pc:sldMk cId="159332473" sldId="282"/>
+            <ac:spMk id="3" creationId="{C20DDFDA-840D-4601-99F5-B29E69A2914B}"/>
+          </ac:spMkLst>
+        </pc:spChg>
+        <pc:spChg chg="mod">
+          <ac:chgData name="Sargsyan, Davit [JRDUS]" userId="3e31b559-84b2-4844-9a39-5ca6ce0fe171" providerId="ADAL" clId="{3F98F558-2F5A-4144-952E-4DC6CA9B686E}" dt="2018-11-05T03:21:59.949" v="111" actId="1076"/>
+          <ac:spMkLst>
+            <pc:docMk/>
+            <pc:sldMk cId="159332473" sldId="282"/>
+            <ac:spMk id="13" creationId="{FA542573-8206-416B-8F4B-21DEC2DE92F7}"/>
+          </ac:spMkLst>
+        </pc:spChg>
+        <pc:spChg chg="mod">
+          <ac:chgData name="Sargsyan, Davit [JRDUS]" userId="3e31b559-84b2-4844-9a39-5ca6ce0fe171" providerId="ADAL" clId="{3F98F558-2F5A-4144-952E-4DC6CA9B686E}" dt="2018-11-05T03:21:59.949" v="111" actId="1076"/>
+          <ac:spMkLst>
+            <pc:docMk/>
+            <pc:sldMk cId="159332473" sldId="282"/>
+            <ac:spMk id="14" creationId="{CE507873-07E8-492F-B773-750434507D71}"/>
+          </ac:spMkLst>
+        </pc:spChg>
+        <pc:spChg chg="mod">
+          <ac:chgData name="Sargsyan, Davit [JRDUS]" userId="3e31b559-84b2-4844-9a39-5ca6ce0fe171" providerId="ADAL" clId="{3F98F558-2F5A-4144-952E-4DC6CA9B686E}" dt="2018-11-05T03:21:59.949" v="111" actId="1076"/>
+          <ac:spMkLst>
+            <pc:docMk/>
+            <pc:sldMk cId="159332473" sldId="282"/>
+            <ac:spMk id="15" creationId="{0BEC1CE4-CE54-4E8B-86F6-9FC8BB81578B}"/>
+          </ac:spMkLst>
+        </pc:spChg>
+        <pc:spChg chg="mod">
+          <ac:chgData name="Sargsyan, Davit [JRDUS]" userId="3e31b559-84b2-4844-9a39-5ca6ce0fe171" providerId="ADAL" clId="{3F98F558-2F5A-4144-952E-4DC6CA9B686E}" dt="2018-11-05T03:21:59.949" v="111" actId="1076"/>
+          <ac:spMkLst>
+            <pc:docMk/>
+            <pc:sldMk cId="159332473" sldId="282"/>
+            <ac:spMk id="16" creationId="{BE1FA7BD-3D8C-4D0E-AD0F-C67FF0C1CA8D}"/>
+          </ac:spMkLst>
+        </pc:spChg>
+        <pc:spChg chg="mod">
+          <ac:chgData name="Sargsyan, Davit [JRDUS]" userId="3e31b559-84b2-4844-9a39-5ca6ce0fe171" providerId="ADAL" clId="{3F98F558-2F5A-4144-952E-4DC6CA9B686E}" dt="2018-11-05T03:21:59.949" v="111" actId="1076"/>
+          <ac:spMkLst>
+            <pc:docMk/>
+            <pc:sldMk cId="159332473" sldId="282"/>
+            <ac:spMk id="17" creationId="{1E3F718F-3EAE-49C7-AE63-B23A2747B394}"/>
+          </ac:spMkLst>
+        </pc:spChg>
+        <pc:grpChg chg="mod">
+          <ac:chgData name="Sargsyan, Davit [JRDUS]" userId="3e31b559-84b2-4844-9a39-5ca6ce0fe171" providerId="ADAL" clId="{3F98F558-2F5A-4144-952E-4DC6CA9B686E}" dt="2018-11-05T03:21:59.949" v="111" actId="1076"/>
+          <ac:grpSpMkLst>
+            <pc:docMk/>
+            <pc:sldMk cId="159332473" sldId="282"/>
+            <ac:grpSpMk id="7" creationId="{44AE4EE1-70AD-452B-B065-67D765711F1A}"/>
+          </ac:grpSpMkLst>
+        </pc:grpChg>
+        <pc:grpChg chg="mod">
+          <ac:chgData name="Sargsyan, Davit [JRDUS]" userId="3e31b559-84b2-4844-9a39-5ca6ce0fe171" providerId="ADAL" clId="{3F98F558-2F5A-4144-952E-4DC6CA9B686E}" dt="2018-11-05T03:21:59.949" v="111" actId="1076"/>
+          <ac:grpSpMkLst>
+            <pc:docMk/>
+            <pc:sldMk cId="159332473" sldId="282"/>
+            <ac:grpSpMk id="10" creationId="{BCFC1305-1EB8-42F1-A9C7-4C129BCB6B8C}"/>
+          </ac:grpSpMkLst>
+        </pc:grpChg>
+      </pc:sldChg>
+      <pc:sldChg chg="addSp modSp">
+        <pc:chgData name="Sargsyan, Davit [JRDUS]" userId="3e31b559-84b2-4844-9a39-5ca6ce0fe171" providerId="ADAL" clId="{3F98F558-2F5A-4144-952E-4DC6CA9B686E}" dt="2018-11-05T03:37:52.355" v="449" actId="113"/>
+        <pc:sldMkLst>
+          <pc:docMk/>
+          <pc:sldMk cId="2211653806" sldId="298"/>
+        </pc:sldMkLst>
+        <pc:spChg chg="add mod">
+          <ac:chgData name="Sargsyan, Davit [JRDUS]" userId="3e31b559-84b2-4844-9a39-5ca6ce0fe171" providerId="ADAL" clId="{3F98F558-2F5A-4144-952E-4DC6CA9B686E}" dt="2018-11-05T03:37:52.355" v="449" actId="113"/>
+          <ac:spMkLst>
+            <pc:docMk/>
+            <pc:sldMk cId="2211653806" sldId="298"/>
+            <ac:spMk id="3" creationId="{B236DB87-D2B1-402A-B6BF-359FF7919623}"/>
+          </ac:spMkLst>
+        </pc:spChg>
+        <pc:picChg chg="mod">
+          <ac:chgData name="Sargsyan, Davit [JRDUS]" userId="3e31b559-84b2-4844-9a39-5ca6ce0fe171" providerId="ADAL" clId="{3F98F558-2F5A-4144-952E-4DC6CA9B686E}" dt="2018-11-05T03:28:15.158" v="281" actId="1076"/>
+          <ac:picMkLst>
+            <pc:docMk/>
+            <pc:sldMk cId="2211653806" sldId="298"/>
+            <ac:picMk id="4" creationId="{B2556490-F735-4AD6-BA41-24FDA2540676}"/>
+          </ac:picMkLst>
+        </pc:picChg>
+      </pc:sldChg>
+      <pc:sldChg chg="addSp delSp modSp">
+        <pc:chgData name="Sargsyan, Davit [JRDUS]" userId="3e31b559-84b2-4844-9a39-5ca6ce0fe171" providerId="ADAL" clId="{3F98F558-2F5A-4144-952E-4DC6CA9B686E}" dt="2018-11-05T03:39:26" v="572" actId="20577"/>
+        <pc:sldMkLst>
+          <pc:docMk/>
+          <pc:sldMk cId="534823619" sldId="299"/>
+        </pc:sldMkLst>
+        <pc:spChg chg="add del">
+          <ac:chgData name="Sargsyan, Davit [JRDUS]" userId="3e31b559-84b2-4844-9a39-5ca6ce0fe171" providerId="ADAL" clId="{3F98F558-2F5A-4144-952E-4DC6CA9B686E}" dt="2018-11-05T03:34:13.363" v="383" actId="478"/>
+          <ac:spMkLst>
+            <pc:docMk/>
+            <pc:sldMk cId="534823619" sldId="299"/>
+            <ac:spMk id="5" creationId="{72DF6133-CF00-49BF-B1BB-7BEF50EC33D1}"/>
+          </ac:spMkLst>
+        </pc:spChg>
+        <pc:spChg chg="add mod">
+          <ac:chgData name="Sargsyan, Davit [JRDUS]" userId="3e31b559-84b2-4844-9a39-5ca6ce0fe171" providerId="ADAL" clId="{3F98F558-2F5A-4144-952E-4DC6CA9B686E}" dt="2018-11-05T03:39:26" v="572" actId="20577"/>
+          <ac:spMkLst>
+            <pc:docMk/>
+            <pc:sldMk cId="534823619" sldId="299"/>
+            <ac:spMk id="6" creationId="{31BA4D72-439C-4DB4-A46A-3013F77BF8A0}"/>
+          </ac:spMkLst>
+        </pc:spChg>
+        <pc:picChg chg="mod">
+          <ac:chgData name="Sargsyan, Davit [JRDUS]" userId="3e31b559-84b2-4844-9a39-5ca6ce0fe171" providerId="ADAL" clId="{3F98F558-2F5A-4144-952E-4DC6CA9B686E}" dt="2018-11-05T03:28:55.221" v="317" actId="1076"/>
+          <ac:picMkLst>
+            <pc:docMk/>
+            <pc:sldMk cId="534823619" sldId="299"/>
+            <ac:picMk id="4" creationId="{20E4021D-B037-4227-B69E-BA2C9C3ACCE9}"/>
           </ac:picMkLst>
         </pc:picChg>
       </pc:sldChg>
@@ -220,13 +384,6 @@
           </ac:picMkLst>
         </pc:picChg>
       </pc:sldChg>
-      <pc:sldChg chg="del">
-        <pc:chgData name="Sargsyan, Davit [JRDUS]" userId="3e31b559-84b2-4844-9a39-5ca6ce0fe171" providerId="ADAL" clId="{DF8DD513-ED6A-4B3D-AA0D-1DCDE15A5C81}" dt="2018-11-02T03:19:08.390" v="151" actId="2696"/>
-        <pc:sldMkLst>
-          <pc:docMk/>
-          <pc:sldMk cId="1475351298" sldId="277"/>
-        </pc:sldMkLst>
-      </pc:sldChg>
       <pc:sldChg chg="modSp">
         <pc:chgData name="Sargsyan, Davit [JRDUS]" userId="3e31b559-84b2-4844-9a39-5ca6ce0fe171" providerId="ADAL" clId="{DF8DD513-ED6A-4B3D-AA0D-1DCDE15A5C81}" dt="2018-11-02T03:47:48.457" v="168" actId="1076"/>
         <pc:sldMkLst>
@@ -289,13 +446,6 @@
           </ac:picMkLst>
         </pc:picChg>
       </pc:sldChg>
-      <pc:sldChg chg="del">
-        <pc:chgData name="Sargsyan, Davit [JRDUS]" userId="3e31b559-84b2-4844-9a39-5ca6ce0fe171" providerId="ADAL" clId="{DF8DD513-ED6A-4B3D-AA0D-1DCDE15A5C81}" dt="2018-11-02T03:19:10.516" v="152" actId="2696"/>
-        <pc:sldMkLst>
-          <pc:docMk/>
-          <pc:sldMk cId="977600658" sldId="281"/>
-        </pc:sldMkLst>
-      </pc:sldChg>
       <pc:sldChg chg="addSp delSp modSp">
         <pc:chgData name="Sargsyan, Davit [JRDUS]" userId="3e31b559-84b2-4844-9a39-5ca6ce0fe171" providerId="ADAL" clId="{DF8DD513-ED6A-4B3D-AA0D-1DCDE15A5C81}" dt="2018-11-02T03:20:58.545" v="165" actId="1076"/>
         <pc:sldMkLst>
@@ -350,112 +500,6 @@
             <ac:picMk id="5" creationId="{CE919DCA-F86F-4593-A964-505AA96B30FB}"/>
           </ac:picMkLst>
         </pc:picChg>
-      </pc:sldChg>
-      <pc:sldChg chg="del">
-        <pc:chgData name="Sargsyan, Davit [JRDUS]" userId="3e31b559-84b2-4844-9a39-5ca6ce0fe171" providerId="ADAL" clId="{DF8DD513-ED6A-4B3D-AA0D-1DCDE15A5C81}" dt="2018-11-02T04:08:46.267" v="199" actId="2696"/>
-        <pc:sldMkLst>
-          <pc:docMk/>
-          <pc:sldMk cId="3758239362" sldId="283"/>
-        </pc:sldMkLst>
-      </pc:sldChg>
-      <pc:sldChg chg="del">
-        <pc:chgData name="Sargsyan, Davit [JRDUS]" userId="3e31b559-84b2-4844-9a39-5ca6ce0fe171" providerId="ADAL" clId="{DF8DD513-ED6A-4B3D-AA0D-1DCDE15A5C81}" dt="2018-11-02T04:08:54.240" v="201" actId="2696"/>
-        <pc:sldMkLst>
-          <pc:docMk/>
-          <pc:sldMk cId="2395060205" sldId="284"/>
-        </pc:sldMkLst>
-      </pc:sldChg>
-      <pc:sldChg chg="delSp del">
-        <pc:chgData name="Sargsyan, Davit [JRDUS]" userId="3e31b559-84b2-4844-9a39-5ca6ce0fe171" providerId="ADAL" clId="{DF8DD513-ED6A-4B3D-AA0D-1DCDE15A5C81}" dt="2018-11-02T03:19:24.590" v="155" actId="2696"/>
-        <pc:sldMkLst>
-          <pc:docMk/>
-          <pc:sldMk cId="1482168521" sldId="285"/>
-        </pc:sldMkLst>
-        <pc:picChg chg="del">
-          <ac:chgData name="Sargsyan, Davit [JRDUS]" userId="3e31b559-84b2-4844-9a39-5ca6ce0fe171" providerId="ADAL" clId="{DF8DD513-ED6A-4B3D-AA0D-1DCDE15A5C81}" dt="2018-11-02T03:19:21.981" v="154" actId="478"/>
-          <ac:picMkLst>
-            <pc:docMk/>
-            <pc:sldMk cId="1482168521" sldId="285"/>
-            <ac:picMk id="5" creationId="{00000000-0000-0000-0000-000000000000}"/>
-          </ac:picMkLst>
-        </pc:picChg>
-      </pc:sldChg>
-      <pc:sldChg chg="del">
-        <pc:chgData name="Sargsyan, Davit [JRDUS]" userId="3e31b559-84b2-4844-9a39-5ca6ce0fe171" providerId="ADAL" clId="{DF8DD513-ED6A-4B3D-AA0D-1DCDE15A5C81}" dt="2018-11-02T04:08:53.433" v="200" actId="2696"/>
-        <pc:sldMkLst>
-          <pc:docMk/>
-          <pc:sldMk cId="2482776900" sldId="286"/>
-        </pc:sldMkLst>
-      </pc:sldChg>
-      <pc:sldChg chg="del">
-        <pc:chgData name="Sargsyan, Davit [JRDUS]" userId="3e31b559-84b2-4844-9a39-5ca6ce0fe171" providerId="ADAL" clId="{DF8DD513-ED6A-4B3D-AA0D-1DCDE15A5C81}" dt="2018-11-02T05:23:48.914" v="209" actId="2696"/>
-        <pc:sldMkLst>
-          <pc:docMk/>
-          <pc:sldMk cId="369901478" sldId="287"/>
-        </pc:sldMkLst>
-      </pc:sldChg>
-      <pc:sldChg chg="del">
-        <pc:chgData name="Sargsyan, Davit [JRDUS]" userId="3e31b559-84b2-4844-9a39-5ca6ce0fe171" providerId="ADAL" clId="{DF8DD513-ED6A-4B3D-AA0D-1DCDE15A5C81}" dt="2018-11-02T05:23:52.221" v="210" actId="2696"/>
-        <pc:sldMkLst>
-          <pc:docMk/>
-          <pc:sldMk cId="1459339904" sldId="288"/>
-        </pc:sldMkLst>
-      </pc:sldChg>
-      <pc:sldChg chg="del">
-        <pc:chgData name="Sargsyan, Davit [JRDUS]" userId="3e31b559-84b2-4844-9a39-5ca6ce0fe171" providerId="ADAL" clId="{DF8DD513-ED6A-4B3D-AA0D-1DCDE15A5C81}" dt="2018-11-02T05:23:53.050" v="211" actId="2696"/>
-        <pc:sldMkLst>
-          <pc:docMk/>
-          <pc:sldMk cId="2814722137" sldId="289"/>
-        </pc:sldMkLst>
-      </pc:sldChg>
-      <pc:sldChg chg="del">
-        <pc:chgData name="Sargsyan, Davit [JRDUS]" userId="3e31b559-84b2-4844-9a39-5ca6ce0fe171" providerId="ADAL" clId="{DF8DD513-ED6A-4B3D-AA0D-1DCDE15A5C81}" dt="2018-11-02T05:23:53.541" v="212" actId="2696"/>
-        <pc:sldMkLst>
-          <pc:docMk/>
-          <pc:sldMk cId="5897920" sldId="290"/>
-        </pc:sldMkLst>
-      </pc:sldChg>
-      <pc:sldChg chg="del">
-        <pc:chgData name="Sargsyan, Davit [JRDUS]" userId="3e31b559-84b2-4844-9a39-5ca6ce0fe171" providerId="ADAL" clId="{DF8DD513-ED6A-4B3D-AA0D-1DCDE15A5C81}" dt="2018-11-02T05:23:54.083" v="213" actId="2696"/>
-        <pc:sldMkLst>
-          <pc:docMk/>
-          <pc:sldMk cId="3208623564" sldId="291"/>
-        </pc:sldMkLst>
-      </pc:sldChg>
-      <pc:sldChg chg="del">
-        <pc:chgData name="Sargsyan, Davit [JRDUS]" userId="3e31b559-84b2-4844-9a39-5ca6ce0fe171" providerId="ADAL" clId="{DF8DD513-ED6A-4B3D-AA0D-1DCDE15A5C81}" dt="2018-11-02T05:23:54.573" v="214" actId="2696"/>
-        <pc:sldMkLst>
-          <pc:docMk/>
-          <pc:sldMk cId="1497085841" sldId="292"/>
-        </pc:sldMkLst>
-      </pc:sldChg>
-      <pc:sldChg chg="del">
-        <pc:chgData name="Sargsyan, Davit [JRDUS]" userId="3e31b559-84b2-4844-9a39-5ca6ce0fe171" providerId="ADAL" clId="{DF8DD513-ED6A-4B3D-AA0D-1DCDE15A5C81}" dt="2018-11-02T05:23:55.153" v="215" actId="2696"/>
-        <pc:sldMkLst>
-          <pc:docMk/>
-          <pc:sldMk cId="2790802841" sldId="293"/>
-        </pc:sldMkLst>
-      </pc:sldChg>
-      <pc:sldChg chg="del">
-        <pc:chgData name="Sargsyan, Davit [JRDUS]" userId="3e31b559-84b2-4844-9a39-5ca6ce0fe171" providerId="ADAL" clId="{DF8DD513-ED6A-4B3D-AA0D-1DCDE15A5C81}" dt="2018-11-02T05:23:55.642" v="216" actId="2696"/>
-        <pc:sldMkLst>
-          <pc:docMk/>
-          <pc:sldMk cId="3794477172" sldId="294"/>
-        </pc:sldMkLst>
-      </pc:sldChg>
-      <pc:sldChg chg="del">
-        <pc:chgData name="Sargsyan, Davit [JRDUS]" userId="3e31b559-84b2-4844-9a39-5ca6ce0fe171" providerId="ADAL" clId="{DF8DD513-ED6A-4B3D-AA0D-1DCDE15A5C81}" dt="2018-11-02T05:23:56.343" v="217" actId="2696"/>
-        <pc:sldMkLst>
-          <pc:docMk/>
-          <pc:sldMk cId="3599126304" sldId="295"/>
-        </pc:sldMkLst>
-      </pc:sldChg>
-      <pc:sldChg chg="del">
-        <pc:chgData name="Sargsyan, Davit [JRDUS]" userId="3e31b559-84b2-4844-9a39-5ca6ce0fe171" providerId="ADAL" clId="{DF8DD513-ED6A-4B3D-AA0D-1DCDE15A5C81}" dt="2018-11-02T05:23:57.110" v="218" actId="2696"/>
-        <pc:sldMkLst>
-          <pc:docMk/>
-          <pc:sldMk cId="1228671488" sldId="296"/>
-        </pc:sldMkLst>
       </pc:sldChg>
       <pc:sldChg chg="addSp modSp add">
         <pc:chgData name="Sargsyan, Davit [JRDUS]" userId="3e31b559-84b2-4844-9a39-5ca6ce0fe171" providerId="ADAL" clId="{DF8DD513-ED6A-4B3D-AA0D-1DCDE15A5C81}" dt="2018-11-02T03:17:36.663" v="144" actId="122"/>
@@ -605,7 +649,7 @@
           <a:p>
             <a:fld id="{F4E3E77F-245B-4B52-927E-62C93A17417E}" type="datetimeFigureOut">
               <a:rPr lang="en-US" smtClean="0"/>
-              <a:t>11/2/2018</a:t>
+              <a:t>11/4/2018</a:t>
             </a:fld>
             <a:endParaRPr lang="en-US"/>
           </a:p>
@@ -1203,6 +1247,90 @@
           <a:p>
             <a:fld id="{6AEF0E16-A542-459D-898C-53EB99DF7EDE}" type="slidenum">
               <a:rPr lang="en-US" smtClean="0"/>
+              <a:t>7</a:t>
+            </a:fld>
+            <a:endParaRPr lang="en-US"/>
+          </a:p>
+        </p:txBody>
+      </p:sp>
+    </p:spTree>
+    <p:extLst>
+      <p:ext uri="{BB962C8B-B14F-4D97-AF65-F5344CB8AC3E}">
+        <p14:creationId xmlns:p14="http://schemas.microsoft.com/office/powerpoint/2010/main" val="2890031830"/>
+      </p:ext>
+    </p:extLst>
+  </p:cSld>
+  <p:clrMapOvr>
+    <a:masterClrMapping/>
+  </p:clrMapOvr>
+</p:notes>
+</file>
+
+<file path=ppt/notesSlides/notesSlide5.xml><?xml version="1.0" encoding="utf-8"?>
+<p:notes xmlns:a="http://schemas.openxmlformats.org/drawingml/2006/main" xmlns:r="http://schemas.openxmlformats.org/officeDocument/2006/relationships" xmlns:p="http://schemas.openxmlformats.org/presentationml/2006/main">
+  <p:cSld>
+    <p:spTree>
+      <p:nvGrpSpPr>
+        <p:cNvPr id="1" name=""/>
+        <p:cNvGrpSpPr/>
+        <p:nvPr/>
+      </p:nvGrpSpPr>
+      <p:grpSpPr>
+        <a:xfrm>
+          <a:off x="0" y="0"/>
+          <a:ext cx="0" cy="0"/>
+          <a:chOff x="0" y="0"/>
+          <a:chExt cx="0" cy="0"/>
+        </a:xfrm>
+      </p:grpSpPr>
+      <p:sp>
+        <p:nvSpPr>
+          <p:cNvPr id="2" name="Slide Image Placeholder 1"/>
+          <p:cNvSpPr>
+            <a:spLocks noGrp="1" noRot="1" noChangeAspect="1"/>
+          </p:cNvSpPr>
+          <p:nvPr>
+            <p:ph type="sldImg"/>
+          </p:nvPr>
+        </p:nvSpPr>
+        <p:spPr/>
+      </p:sp>
+      <p:sp>
+        <p:nvSpPr>
+          <p:cNvPr id="3" name="Notes Placeholder 2"/>
+          <p:cNvSpPr>
+            <a:spLocks noGrp="1"/>
+          </p:cNvSpPr>
+          <p:nvPr>
+            <p:ph type="body" idx="1"/>
+          </p:nvPr>
+        </p:nvSpPr>
+        <p:spPr/>
+        <p:txBody>
+          <a:bodyPr/>
+          <a:lstStyle/>
+          <a:p>
+            <a:endParaRPr lang="en-US" dirty="0"/>
+          </a:p>
+        </p:txBody>
+      </p:sp>
+      <p:sp>
+        <p:nvSpPr>
+          <p:cNvPr id="4" name="Slide Number Placeholder 3"/>
+          <p:cNvSpPr>
+            <a:spLocks noGrp="1"/>
+          </p:cNvSpPr>
+          <p:nvPr>
+            <p:ph type="sldNum" sz="quarter" idx="10"/>
+          </p:nvPr>
+        </p:nvSpPr>
+        <p:spPr/>
+        <p:txBody>
+          <a:bodyPr/>
+          <a:lstStyle/>
+          <a:p>
+            <a:fld id="{6AEF0E16-A542-459D-898C-53EB99DF7EDE}" type="slidenum">
+              <a:rPr lang="en-US" smtClean="0"/>
               <a:t>9</a:t>
             </a:fld>
             <a:endParaRPr lang="en-US"/>
@@ -1369,7 +1497,7 @@
           <a:p>
             <a:fld id="{987A3740-7C91-4816-B141-D9452EB428CA}" type="datetime1">
               <a:rPr lang="en-US" smtClean="0"/>
-              <a:t>11/2/2018</a:t>
+              <a:t>11/4/2018</a:t>
             </a:fld>
             <a:endParaRPr lang="en-US"/>
           </a:p>
@@ -1567,7 +1695,7 @@
           <a:p>
             <a:fld id="{18C39ACC-4F88-4D20-9D15-72C111C37164}" type="datetime1">
               <a:rPr lang="en-US" smtClean="0"/>
-              <a:t>11/2/2018</a:t>
+              <a:t>11/4/2018</a:t>
             </a:fld>
             <a:endParaRPr lang="en-US"/>
           </a:p>
@@ -1775,7 +1903,7 @@
           <a:p>
             <a:fld id="{DBD8F9E6-EA7F-4768-BE56-2CFF2B927B0D}" type="datetime1">
               <a:rPr lang="en-US" smtClean="0"/>
-              <a:t>11/2/2018</a:t>
+              <a:t>11/4/2018</a:t>
             </a:fld>
             <a:endParaRPr lang="en-US"/>
           </a:p>
@@ -1973,7 +2101,7 @@
           <a:p>
             <a:fld id="{6C9B43D4-846A-4BC9-B800-DA2CC6908B8C}" type="datetime1">
               <a:rPr lang="en-US" smtClean="0"/>
-              <a:t>11/2/2018</a:t>
+              <a:t>11/4/2018</a:t>
             </a:fld>
             <a:endParaRPr lang="en-US"/>
           </a:p>
@@ -2248,7 +2376,7 @@
           <a:p>
             <a:fld id="{E2F79AAA-2005-45D0-B870-49CD7170C2B8}" type="datetime1">
               <a:rPr lang="en-US" smtClean="0"/>
-              <a:t>11/2/2018</a:t>
+              <a:t>11/4/2018</a:t>
             </a:fld>
             <a:endParaRPr lang="en-US"/>
           </a:p>
@@ -2513,7 +2641,7 @@
           <a:p>
             <a:fld id="{BED78C31-1A55-495D-A180-BCCE112483A8}" type="datetime1">
               <a:rPr lang="en-US" smtClean="0"/>
-              <a:t>11/2/2018</a:t>
+              <a:t>11/4/2018</a:t>
             </a:fld>
             <a:endParaRPr lang="en-US"/>
           </a:p>
@@ -2925,7 +3053,7 @@
           <a:p>
             <a:fld id="{2C9CF125-D1AD-4E96-A297-9D9113C09B19}" type="datetime1">
               <a:rPr lang="en-US" smtClean="0"/>
-              <a:t>11/2/2018</a:t>
+              <a:t>11/4/2018</a:t>
             </a:fld>
             <a:endParaRPr lang="en-US"/>
           </a:p>
@@ -3066,7 +3194,7 @@
           <a:p>
             <a:fld id="{777270FA-B6E5-4569-82F1-484F08A37866}" type="datetime1">
               <a:rPr lang="en-US" smtClean="0"/>
-              <a:t>11/2/2018</a:t>
+              <a:t>11/4/2018</a:t>
             </a:fld>
             <a:endParaRPr lang="en-US"/>
           </a:p>
@@ -3179,7 +3307,7 @@
           <a:p>
             <a:fld id="{9D04E11D-C808-4738-8709-918DC8E6C7B0}" type="datetime1">
               <a:rPr lang="en-US" smtClean="0"/>
-              <a:t>11/2/2018</a:t>
+              <a:t>11/4/2018</a:t>
             </a:fld>
             <a:endParaRPr lang="en-US"/>
           </a:p>
@@ -3490,7 +3618,7 @@
           <a:p>
             <a:fld id="{58E9B03D-FCA5-4A93-A552-A677BBEE26FB}" type="datetime1">
               <a:rPr lang="en-US" smtClean="0"/>
-              <a:t>11/2/2018</a:t>
+              <a:t>11/4/2018</a:t>
             </a:fld>
             <a:endParaRPr lang="en-US"/>
           </a:p>
@@ -3778,7 +3906,7 @@
           <a:p>
             <a:fld id="{B09C4BF6-6759-4193-936F-F90A7F051018}" type="datetime1">
               <a:rPr lang="en-US" smtClean="0"/>
-              <a:t>11/2/2018</a:t>
+              <a:t>11/4/2018</a:t>
             </a:fld>
             <a:endParaRPr lang="en-US"/>
           </a:p>
@@ -4019,7 +4147,7 @@
           <a:p>
             <a:fld id="{921807F9-1BE2-448A-BEB0-758171FDC5E3}" type="datetime1">
               <a:rPr lang="en-US" smtClean="0"/>
-              <a:t>11/2/2018</a:t>
+              <a:t>11/4/2018</a:t>
             </a:fld>
             <a:endParaRPr lang="en-US"/>
           </a:p>
@@ -4643,7 +4771,7 @@
         </p:blipFill>
         <p:spPr>
           <a:xfrm>
-            <a:off x="2667000" y="0"/>
+            <a:off x="152401" y="0"/>
             <a:ext cx="6858000" cy="6858000"/>
           </a:xfrm>
           <a:prstGeom prst="rect">
@@ -4651,6 +4779,98 @@
           </a:prstGeom>
         </p:spPr>
       </p:pic>
+      <p:sp>
+        <p:nvSpPr>
+          <p:cNvPr id="6" name="TextBox 5">
+            <a:extLst>
+              <a:ext uri="{FF2B5EF4-FFF2-40B4-BE49-F238E27FC236}">
+                <a16:creationId xmlns:a16="http://schemas.microsoft.com/office/drawing/2014/main" id="{31BA4D72-439C-4DB4-A46A-3013F77BF8A0}"/>
+              </a:ext>
+            </a:extLst>
+          </p:cNvPr>
+          <p:cNvSpPr txBox="1"/>
+          <p:nvPr/>
+        </p:nvSpPr>
+        <p:spPr>
+          <a:xfrm>
+            <a:off x="7585364" y="1423554"/>
+            <a:ext cx="3512127" cy="3970318"/>
+          </a:xfrm>
+          <a:prstGeom prst="rect">
+            <a:avLst/>
+          </a:prstGeom>
+          <a:noFill/>
+        </p:spPr>
+        <p:txBody>
+          <a:bodyPr wrap="square" rtlCol="0">
+            <a:spAutoFit/>
+          </a:bodyPr>
+          <a:lstStyle/>
+          <a:p>
+            <a:r>
+              <a:rPr lang="en-US" dirty="0"/>
+              <a:t>Add a table of the genes + legend. Add the following 4 genes to the figure and the list:</a:t>
+            </a:r>
+          </a:p>
+          <a:p>
+            <a:endParaRPr lang="en-US" dirty="0"/>
+          </a:p>
+          <a:p>
+            <a:pPr fontAlgn="b"/>
+            <a:r>
+              <a:rPr lang="en-US" b="1" dirty="0"/>
+              <a:t>Fgl2</a:t>
+            </a:r>
+          </a:p>
+          <a:p>
+            <a:pPr fontAlgn="b"/>
+            <a:r>
+              <a:rPr lang="en-US" b="1" dirty="0" err="1"/>
+              <a:t>Gulo</a:t>
+            </a:r>
+            <a:r>
+              <a:rPr lang="en-US" b="1" dirty="0"/>
+              <a:t>/(GLO)</a:t>
+            </a:r>
+          </a:p>
+          <a:p>
+            <a:pPr fontAlgn="b"/>
+            <a:r>
+              <a:rPr lang="en-US" b="1" dirty="0"/>
+              <a:t>Kcnip2/KChIP2</a:t>
+            </a:r>
+          </a:p>
+          <a:p>
+            <a:pPr fontAlgn="b"/>
+            <a:r>
+              <a:rPr lang="en-US" b="1" dirty="0"/>
+              <a:t>Bmp8b</a:t>
+            </a:r>
+          </a:p>
+          <a:p>
+            <a:pPr fontAlgn="b"/>
+            <a:endParaRPr lang="en-US" dirty="0"/>
+          </a:p>
+          <a:p>
+            <a:pPr fontAlgn="b"/>
+            <a:r>
+              <a:rPr lang="en-US" dirty="0"/>
+              <a:t>Write up methodology.</a:t>
+            </a:r>
+          </a:p>
+          <a:p>
+            <a:pPr fontAlgn="b"/>
+            <a:endParaRPr lang="en-US" dirty="0"/>
+          </a:p>
+          <a:p>
+            <a:pPr fontAlgn="b"/>
+            <a:r>
+              <a:rPr lang="en-US" dirty="0"/>
+              <a:t>Flip the lollipop plots for just these 4 genes. Reverse the X-axis so negatives are on the left.</a:t>
+            </a:r>
+          </a:p>
+        </p:txBody>
+      </p:sp>
     </p:spTree>
     <p:extLst>
       <p:ext uri="{BB962C8B-B14F-4D97-AF65-F5344CB8AC3E}">
@@ -5283,7 +5503,7 @@
         </p:nvGrpSpPr>
         <p:grpSpPr>
           <a:xfrm rot="10800000">
-            <a:off x="8205120" y="870858"/>
+            <a:off x="8205120" y="340347"/>
             <a:ext cx="2736462" cy="1854484"/>
             <a:chOff x="6153839" y="1075764"/>
             <a:chExt cx="3385449" cy="2310375"/>
@@ -5408,7 +5628,7 @@
         </p:nvGrpSpPr>
         <p:grpSpPr>
           <a:xfrm>
-            <a:off x="8191515" y="4124340"/>
+            <a:off x="8205119" y="2919958"/>
             <a:ext cx="2736463" cy="1849040"/>
             <a:chOff x="5454979" y="1075763"/>
             <a:chExt cx="3945347" cy="2310374"/>
@@ -5533,7 +5753,7 @@
         </p:nvSpPr>
         <p:spPr>
           <a:xfrm>
-            <a:off x="9348540" y="1613434"/>
+            <a:off x="9348540" y="1082923"/>
             <a:ext cx="535724" cy="369332"/>
           </a:xfrm>
           <a:prstGeom prst="rect">
@@ -5568,7 +5788,7 @@
         </p:nvSpPr>
         <p:spPr>
           <a:xfrm>
-            <a:off x="9341738" y="4864193"/>
+            <a:off x="9355342" y="3659811"/>
             <a:ext cx="418704" cy="369332"/>
           </a:xfrm>
           <a:prstGeom prst="rect">
@@ -5603,7 +5823,7 @@
         </p:nvSpPr>
         <p:spPr>
           <a:xfrm>
-            <a:off x="8789493" y="530511"/>
+            <a:off x="8789493" y="0"/>
             <a:ext cx="535724" cy="369332"/>
           </a:xfrm>
           <a:prstGeom prst="rect">
@@ -5638,7 +5858,7 @@
         </p:nvSpPr>
         <p:spPr>
           <a:xfrm>
-            <a:off x="9760442" y="2750623"/>
+            <a:off x="9760442" y="2220112"/>
             <a:ext cx="710451" cy="369332"/>
           </a:xfrm>
           <a:prstGeom prst="rect">
@@ -5673,7 +5893,7 @@
         </p:nvSpPr>
         <p:spPr>
           <a:xfrm>
-            <a:off x="8789493" y="3774165"/>
+            <a:off x="8803097" y="2569783"/>
             <a:ext cx="535724" cy="369332"/>
           </a:xfrm>
           <a:prstGeom prst="rect">
@@ -5765,6 +5985,41 @@
           </a:prstGeom>
         </p:spPr>
       </p:pic>
+      <p:sp>
+        <p:nvSpPr>
+          <p:cNvPr id="3" name="TextBox 2">
+            <a:extLst>
+              <a:ext uri="{FF2B5EF4-FFF2-40B4-BE49-F238E27FC236}">
+                <a16:creationId xmlns:a16="http://schemas.microsoft.com/office/drawing/2014/main" id="{C20DDFDA-840D-4601-99F5-B29E69A2914B}"/>
+              </a:ext>
+            </a:extLst>
+          </p:cNvPr>
+          <p:cNvSpPr txBox="1"/>
+          <p:nvPr/>
+        </p:nvSpPr>
+        <p:spPr>
+          <a:xfrm>
+            <a:off x="7359197" y="5035213"/>
+            <a:ext cx="3932039" cy="1200329"/>
+          </a:xfrm>
+          <a:prstGeom prst="rect">
+            <a:avLst/>
+          </a:prstGeom>
+          <a:noFill/>
+        </p:spPr>
+        <p:txBody>
+          <a:bodyPr wrap="square" rtlCol="0">
+            <a:spAutoFit/>
+          </a:bodyPr>
+          <a:lstStyle/>
+          <a:p>
+            <a:r>
+              <a:rPr lang="en-US" dirty="0"/>
+              <a:t>ADD rectangular heatmaps – top 50 up and top 50 down for each of the treatments (not the differences), also same for the differences.</a:t>
+            </a:r>
+          </a:p>
+        </p:txBody>
+      </p:sp>
     </p:spTree>
     <p:extLst>
       <p:ext uri="{BB962C8B-B14F-4D97-AF65-F5344CB8AC3E}">
@@ -5970,7 +6225,7 @@
           <p:nvPr/>
         </p:nvPicPr>
         <p:blipFill>
-          <a:blip r:embed="rId2">
+          <a:blip r:embed="rId3">
             <a:extLst>
               <a:ext uri="{28A0092B-C50C-407E-A947-70E740481C1C}">
                 <a14:useLocalDpi xmlns:a14="http://schemas.microsoft.com/office/drawing/2010/main" val="0"/>
@@ -6006,7 +6261,7 @@
           <p:nvPr/>
         </p:nvPicPr>
         <p:blipFill rotWithShape="1">
-          <a:blip r:embed="rId3">
+          <a:blip r:embed="rId4">
             <a:extLst>
               <a:ext uri="{28A0092B-C50C-407E-A947-70E740481C1C}">
                 <a14:useLocalDpi xmlns:a14="http://schemas.microsoft.com/office/drawing/2010/main" val="0"/>
@@ -6026,6 +6281,41 @@
           </a:prstGeom>
         </p:spPr>
       </p:pic>
+      <p:sp>
+        <p:nvSpPr>
+          <p:cNvPr id="3" name="TextBox 2">
+            <a:extLst>
+              <a:ext uri="{FF2B5EF4-FFF2-40B4-BE49-F238E27FC236}">
+                <a16:creationId xmlns:a16="http://schemas.microsoft.com/office/drawing/2014/main" id="{C1421D1E-A114-4647-8F5E-8BF308E6776E}"/>
+              </a:ext>
+            </a:extLst>
+          </p:cNvPr>
+          <p:cNvSpPr txBox="1"/>
+          <p:nvPr/>
+        </p:nvSpPr>
+        <p:spPr>
+          <a:xfrm>
+            <a:off x="6806046" y="5987018"/>
+            <a:ext cx="5042021" cy="369332"/>
+          </a:xfrm>
+          <a:prstGeom prst="rect">
+            <a:avLst/>
+          </a:prstGeom>
+          <a:noFill/>
+        </p:spPr>
+        <p:txBody>
+          <a:bodyPr wrap="none" rtlCol="0">
+            <a:spAutoFit/>
+          </a:bodyPr>
+          <a:lstStyle/>
+          <a:p>
+            <a:r>
+              <a:rPr lang="en-US" dirty="0"/>
+              <a:t>State the numbers in the figure description (legend)</a:t>
+            </a:r>
+          </a:p>
+        </p:txBody>
+      </p:sp>
     </p:spTree>
     <p:extLst>
       <p:ext uri="{BB962C8B-B14F-4D97-AF65-F5344CB8AC3E}">
@@ -6113,7 +6403,7 @@
         </p:blipFill>
         <p:spPr>
           <a:xfrm>
-            <a:off x="2511137" y="685800"/>
+            <a:off x="183573" y="685800"/>
             <a:ext cx="6400800" cy="5486400"/>
           </a:xfrm>
           <a:prstGeom prst="rect">
@@ -6152,6 +6442,41 @@
             <a:r>
               <a:rPr lang="en-US" dirty="0"/>
               <a:t>NOTE: SEM is negligible</a:t>
+            </a:r>
+          </a:p>
+        </p:txBody>
+      </p:sp>
+      <p:sp>
+        <p:nvSpPr>
+          <p:cNvPr id="3" name="TextBox 2">
+            <a:extLst>
+              <a:ext uri="{FF2B5EF4-FFF2-40B4-BE49-F238E27FC236}">
+                <a16:creationId xmlns:a16="http://schemas.microsoft.com/office/drawing/2014/main" id="{8834F32D-79E0-46A4-B244-B497B8F3EE3D}"/>
+              </a:ext>
+            </a:extLst>
+          </p:cNvPr>
+          <p:cNvSpPr txBox="1"/>
+          <p:nvPr/>
+        </p:nvSpPr>
+        <p:spPr>
+          <a:xfrm>
+            <a:off x="8021782" y="2161309"/>
+            <a:ext cx="2026227" cy="646331"/>
+          </a:xfrm>
+          <a:prstGeom prst="rect">
+            <a:avLst/>
+          </a:prstGeom>
+          <a:noFill/>
+        </p:spPr>
+        <p:txBody>
+          <a:bodyPr wrap="square" rtlCol="0">
+            <a:spAutoFit/>
+          </a:bodyPr>
+          <a:lstStyle/>
+          <a:p>
+            <a:r>
+              <a:rPr lang="en-US" dirty="0"/>
+              <a:t>ADD TABLE with mu +/- SD</a:t>
             </a:r>
           </a:p>
         </p:txBody>
@@ -6243,7 +6568,7 @@
         </p:blipFill>
         <p:spPr>
           <a:xfrm>
-            <a:off x="2667000" y="0"/>
+            <a:off x="277091" y="0"/>
             <a:ext cx="6858000" cy="6858000"/>
           </a:xfrm>
           <a:prstGeom prst="rect">
@@ -6251,6 +6576,76 @@
           </a:prstGeom>
         </p:spPr>
       </p:pic>
+      <p:sp>
+        <p:nvSpPr>
+          <p:cNvPr id="3" name="TextBox 2">
+            <a:extLst>
+              <a:ext uri="{FF2B5EF4-FFF2-40B4-BE49-F238E27FC236}">
+                <a16:creationId xmlns:a16="http://schemas.microsoft.com/office/drawing/2014/main" id="{B236DB87-D2B1-402A-B6BF-359FF7919623}"/>
+              </a:ext>
+            </a:extLst>
+          </p:cNvPr>
+          <p:cNvSpPr txBox="1"/>
+          <p:nvPr/>
+        </p:nvSpPr>
+        <p:spPr>
+          <a:xfrm>
+            <a:off x="7585364" y="1423554"/>
+            <a:ext cx="3512127" cy="2308324"/>
+          </a:xfrm>
+          <a:prstGeom prst="rect">
+            <a:avLst/>
+          </a:prstGeom>
+          <a:noFill/>
+        </p:spPr>
+        <p:txBody>
+          <a:bodyPr wrap="square" rtlCol="0">
+            <a:spAutoFit/>
+          </a:bodyPr>
+          <a:lstStyle/>
+          <a:p>
+            <a:r>
+              <a:rPr lang="en-US" dirty="0"/>
+              <a:t>Add a table of the genes + legend. Add the following 4 genes to the figure and the list:</a:t>
+            </a:r>
+          </a:p>
+          <a:p>
+            <a:endParaRPr lang="en-US" dirty="0"/>
+          </a:p>
+          <a:p>
+            <a:pPr fontAlgn="b"/>
+            <a:r>
+              <a:rPr lang="en-US" b="1" dirty="0"/>
+              <a:t>Fgl2</a:t>
+            </a:r>
+          </a:p>
+          <a:p>
+            <a:pPr fontAlgn="b"/>
+            <a:r>
+              <a:rPr lang="en-US" b="1" dirty="0" err="1"/>
+              <a:t>Gulo</a:t>
+            </a:r>
+            <a:r>
+              <a:rPr lang="en-US" b="1" dirty="0"/>
+              <a:t>/(GLO)</a:t>
+            </a:r>
+          </a:p>
+          <a:p>
+            <a:pPr fontAlgn="b"/>
+            <a:r>
+              <a:rPr lang="en-US" b="1" dirty="0"/>
+              <a:t>Kcnip2/KChIP2</a:t>
+            </a:r>
+          </a:p>
+          <a:p>
+            <a:pPr fontAlgn="b"/>
+            <a:r>
+              <a:rPr lang="en-US" b="1" dirty="0"/>
+              <a:t>Bmp8b</a:t>
+            </a:r>
+          </a:p>
+        </p:txBody>
+      </p:sp>
     </p:spTree>
     <p:extLst>
       <p:ext uri="{BB962C8B-B14F-4D97-AF65-F5344CB8AC3E}">

</xml_diff>